<commit_message>
Updated presentation with git URL
</commit_message>
<xml_diff>
--- a/Enterprise_Logging_with_log4js.pptx
+++ b/Enterprise_Logging_with_log4js.pptx
@@ -112,6 +112,11 @@
       </a:defRPr>
     </a:lvl9pPr>
   </p:defaultTextStyle>
+  <p:extLst>
+    <p:ext uri="{EFAFB233-063F-42B5-8137-9DF3F51BA10A}">
+      <p15:sldGuideLst xmlns:p15="http://schemas.microsoft.com/office/powerpoint/2012/main"/>
+    </p:ext>
+  </p:extLst>
 </p:presentation>
 </file>
 
@@ -993,6 +998,13 @@
     <dgm:pt modelId="{6F819A48-B481-404D-98DF-6BB2A9C39430}" type="pres">
       <dgm:prSet presAssocID="{33A65EFF-B367-423E-A2C5-98EFBA3B5ED8}" presName="wedge1" presStyleLbl="node1" presStyleIdx="0" presStyleCnt="3"/>
       <dgm:spPr/>
+      <dgm:t>
+        <a:bodyPr/>
+        <a:lstStyle/>
+        <a:p>
+          <a:endParaRPr lang="en-IN"/>
+        </a:p>
+      </dgm:t>
     </dgm:pt>
     <dgm:pt modelId="{E36BAFCD-546C-4A6B-AA46-F85A7FB83292}" type="pres">
       <dgm:prSet presAssocID="{33A65EFF-B367-423E-A2C5-98EFBA3B5ED8}" presName="wedge1Tx" presStyleLbl="node1" presStyleIdx="0" presStyleCnt="3">
@@ -1003,10 +1015,24 @@
         </dgm:presLayoutVars>
       </dgm:prSet>
       <dgm:spPr/>
+      <dgm:t>
+        <a:bodyPr/>
+        <a:lstStyle/>
+        <a:p>
+          <a:endParaRPr lang="en-IN"/>
+        </a:p>
+      </dgm:t>
     </dgm:pt>
     <dgm:pt modelId="{EBEE654B-1C34-49B5-A8B3-C6E76306B477}" type="pres">
       <dgm:prSet presAssocID="{33A65EFF-B367-423E-A2C5-98EFBA3B5ED8}" presName="wedge2" presStyleLbl="node1" presStyleIdx="1" presStyleCnt="3"/>
       <dgm:spPr/>
+      <dgm:t>
+        <a:bodyPr/>
+        <a:lstStyle/>
+        <a:p>
+          <a:endParaRPr lang="en-IN"/>
+        </a:p>
+      </dgm:t>
     </dgm:pt>
     <dgm:pt modelId="{85DF6C7C-06CE-4396-A365-5E13E6762850}" type="pres">
       <dgm:prSet presAssocID="{33A65EFF-B367-423E-A2C5-98EFBA3B5ED8}" presName="wedge2Tx" presStyleLbl="node1" presStyleIdx="1" presStyleCnt="3">
@@ -1017,10 +1043,24 @@
         </dgm:presLayoutVars>
       </dgm:prSet>
       <dgm:spPr/>
+      <dgm:t>
+        <a:bodyPr/>
+        <a:lstStyle/>
+        <a:p>
+          <a:endParaRPr lang="en-IN"/>
+        </a:p>
+      </dgm:t>
     </dgm:pt>
     <dgm:pt modelId="{FA5A381F-16B6-42C7-BDDC-D2999B9DCEB9}" type="pres">
       <dgm:prSet presAssocID="{33A65EFF-B367-423E-A2C5-98EFBA3B5ED8}" presName="wedge3" presStyleLbl="node1" presStyleIdx="2" presStyleCnt="3"/>
       <dgm:spPr/>
+      <dgm:t>
+        <a:bodyPr/>
+        <a:lstStyle/>
+        <a:p>
+          <a:endParaRPr lang="en-IN"/>
+        </a:p>
+      </dgm:t>
     </dgm:pt>
     <dgm:pt modelId="{E34A3E45-1897-4E22-94E6-FBBAEEAA1C3E}" type="pres">
       <dgm:prSet presAssocID="{33A65EFF-B367-423E-A2C5-98EFBA3B5ED8}" presName="wedge3Tx" presStyleLbl="node1" presStyleIdx="2" presStyleCnt="3">
@@ -1031,6 +1071,13 @@
         </dgm:presLayoutVars>
       </dgm:prSet>
       <dgm:spPr/>
+      <dgm:t>
+        <a:bodyPr/>
+        <a:lstStyle/>
+        <a:p>
+          <a:endParaRPr lang="en-IN"/>
+        </a:p>
+      </dgm:t>
     </dgm:pt>
   </dgm:ptLst>
   <dgm:cxnLst>
@@ -1069,246 +1116,6 @@
       <dsp:cNvGrpSpPr/>
     </dsp:nvGrpSpPr>
     <dsp:grpSpPr/>
-    <dsp:sp modelId="{6F819A48-B481-404D-98DF-6BB2A9C39430}">
-      <dsp:nvSpPr>
-        <dsp:cNvPr id="0" name=""/>
-        <dsp:cNvSpPr/>
-      </dsp:nvSpPr>
-      <dsp:spPr>
-        <a:xfrm>
-          <a:off x="1905474" y="365760"/>
-          <a:ext cx="4551680" cy="4551680"/>
-        </a:xfrm>
-        <a:prstGeom prst="pie">
-          <a:avLst>
-            <a:gd name="adj1" fmla="val 16200000"/>
-            <a:gd name="adj2" fmla="val 1800000"/>
-          </a:avLst>
-        </a:prstGeom>
-        <a:solidFill>
-          <a:schemeClr val="accent1">
-            <a:hueOff val="0"/>
-            <a:satOff val="0"/>
-            <a:lumOff val="0"/>
-            <a:alphaOff val="0"/>
-          </a:schemeClr>
-        </a:solidFill>
-        <a:ln w="15875" cap="rnd" cmpd="sng" algn="ctr">
-          <a:solidFill>
-            <a:schemeClr val="lt1">
-              <a:hueOff val="0"/>
-              <a:satOff val="0"/>
-              <a:lumOff val="0"/>
-              <a:alphaOff val="0"/>
-            </a:schemeClr>
-          </a:solidFill>
-          <a:prstDash val="solid"/>
-        </a:ln>
-        <a:effectLst/>
-      </dsp:spPr>
-      <dsp:style>
-        <a:lnRef idx="2">
-          <a:scrgbClr r="0" g="0" b="0"/>
-        </a:lnRef>
-        <a:fillRef idx="1">
-          <a:scrgbClr r="0" g="0" b="0"/>
-        </a:fillRef>
-        <a:effectRef idx="0">
-          <a:scrgbClr r="0" g="0" b="0"/>
-        </a:effectRef>
-        <a:fontRef idx="minor">
-          <a:schemeClr val="lt1"/>
-        </a:fontRef>
-      </dsp:style>
-      <dsp:txBody>
-        <a:bodyPr spcFirstLastPara="0" vert="horz" wrap="square" lIns="39370" tIns="39370" rIns="39370" bIns="39370" numCol="1" spcCol="1270" anchor="ctr" anchorCtr="0">
-          <a:noAutofit/>
-        </a:bodyPr>
-        <a:lstStyle/>
-        <a:p>
-          <a:pPr lvl="0" algn="ctr" defTabSz="1377950">
-            <a:lnSpc>
-              <a:spcPct val="90000"/>
-            </a:lnSpc>
-            <a:spcBef>
-              <a:spcPct val="0"/>
-            </a:spcBef>
-            <a:spcAft>
-              <a:spcPct val="35000"/>
-            </a:spcAft>
-          </a:pPr>
-          <a:r>
-            <a:rPr lang="en-IN" sz="3100" kern="1200" dirty="0" smtClean="0"/>
-            <a:t>Logger</a:t>
-          </a:r>
-          <a:endParaRPr lang="en-IN" sz="3100" kern="1200" dirty="0"/>
-        </a:p>
-      </dsp:txBody>
-      <dsp:txXfrm>
-        <a:off x="4380179" y="1205653"/>
-        <a:ext cx="1544320" cy="1517226"/>
-      </dsp:txXfrm>
-    </dsp:sp>
-    <dsp:sp modelId="{EBEE654B-1C34-49B5-A8B3-C6E76306B477}">
-      <dsp:nvSpPr>
-        <dsp:cNvPr id="0" name=""/>
-        <dsp:cNvSpPr/>
-      </dsp:nvSpPr>
-      <dsp:spPr>
-        <a:xfrm>
-          <a:off x="1670845" y="501226"/>
-          <a:ext cx="4551680" cy="4551680"/>
-        </a:xfrm>
-        <a:prstGeom prst="pie">
-          <a:avLst>
-            <a:gd name="adj1" fmla="val 1800000"/>
-            <a:gd name="adj2" fmla="val 9000000"/>
-          </a:avLst>
-        </a:prstGeom>
-        <a:solidFill>
-          <a:schemeClr val="accent1">
-            <a:hueOff val="0"/>
-            <a:satOff val="0"/>
-            <a:lumOff val="0"/>
-            <a:alphaOff val="0"/>
-          </a:schemeClr>
-        </a:solidFill>
-        <a:ln w="15875" cap="rnd" cmpd="sng" algn="ctr">
-          <a:solidFill>
-            <a:schemeClr val="lt1">
-              <a:hueOff val="0"/>
-              <a:satOff val="0"/>
-              <a:lumOff val="0"/>
-              <a:alphaOff val="0"/>
-            </a:schemeClr>
-          </a:solidFill>
-          <a:prstDash val="solid"/>
-        </a:ln>
-        <a:effectLst/>
-      </dsp:spPr>
-      <dsp:style>
-        <a:lnRef idx="2">
-          <a:scrgbClr r="0" g="0" b="0"/>
-        </a:lnRef>
-        <a:fillRef idx="1">
-          <a:scrgbClr r="0" g="0" b="0"/>
-        </a:fillRef>
-        <a:effectRef idx="0">
-          <a:scrgbClr r="0" g="0" b="0"/>
-        </a:effectRef>
-        <a:fontRef idx="minor">
-          <a:schemeClr val="lt1"/>
-        </a:fontRef>
-      </dsp:style>
-      <dsp:txBody>
-        <a:bodyPr spcFirstLastPara="0" vert="horz" wrap="square" lIns="39370" tIns="39370" rIns="39370" bIns="39370" numCol="1" spcCol="1270" anchor="ctr" anchorCtr="0">
-          <a:noAutofit/>
-        </a:bodyPr>
-        <a:lstStyle/>
-        <a:p>
-          <a:pPr lvl="0" algn="ctr" defTabSz="1377950">
-            <a:lnSpc>
-              <a:spcPct val="90000"/>
-            </a:lnSpc>
-            <a:spcBef>
-              <a:spcPct val="0"/>
-            </a:spcBef>
-            <a:spcAft>
-              <a:spcPct val="35000"/>
-            </a:spcAft>
-          </a:pPr>
-          <a:r>
-            <a:rPr lang="en-IN" sz="3100" kern="1200" dirty="0" smtClean="0"/>
-            <a:t>Appender</a:t>
-          </a:r>
-          <a:endParaRPr lang="en-IN" sz="3100" kern="1200" dirty="0"/>
-        </a:p>
-      </dsp:txBody>
-      <dsp:txXfrm>
-        <a:off x="2917139" y="3373120"/>
-        <a:ext cx="2059093" cy="1408853"/>
-      </dsp:txXfrm>
-    </dsp:sp>
-    <dsp:sp modelId="{FA5A381F-16B6-42C7-BDDC-D2999B9DCEB9}">
-      <dsp:nvSpPr>
-        <dsp:cNvPr id="0" name=""/>
-        <dsp:cNvSpPr/>
-      </dsp:nvSpPr>
-      <dsp:spPr>
-        <a:xfrm>
-          <a:off x="1670845" y="501226"/>
-          <a:ext cx="4551680" cy="4551680"/>
-        </a:xfrm>
-        <a:prstGeom prst="pie">
-          <a:avLst>
-            <a:gd name="adj1" fmla="val 9000000"/>
-            <a:gd name="adj2" fmla="val 16200000"/>
-          </a:avLst>
-        </a:prstGeom>
-        <a:solidFill>
-          <a:schemeClr val="accent1">
-            <a:hueOff val="0"/>
-            <a:satOff val="0"/>
-            <a:lumOff val="0"/>
-            <a:alphaOff val="0"/>
-          </a:schemeClr>
-        </a:solidFill>
-        <a:ln w="15875" cap="rnd" cmpd="sng" algn="ctr">
-          <a:solidFill>
-            <a:schemeClr val="lt1">
-              <a:hueOff val="0"/>
-              <a:satOff val="0"/>
-              <a:lumOff val="0"/>
-              <a:alphaOff val="0"/>
-            </a:schemeClr>
-          </a:solidFill>
-          <a:prstDash val="solid"/>
-        </a:ln>
-        <a:effectLst/>
-      </dsp:spPr>
-      <dsp:style>
-        <a:lnRef idx="2">
-          <a:scrgbClr r="0" g="0" b="0"/>
-        </a:lnRef>
-        <a:fillRef idx="1">
-          <a:scrgbClr r="0" g="0" b="0"/>
-        </a:fillRef>
-        <a:effectRef idx="0">
-          <a:scrgbClr r="0" g="0" b="0"/>
-        </a:effectRef>
-        <a:fontRef idx="minor">
-          <a:schemeClr val="lt1"/>
-        </a:fontRef>
-      </dsp:style>
-      <dsp:txBody>
-        <a:bodyPr spcFirstLastPara="0" vert="horz" wrap="square" lIns="39370" tIns="39370" rIns="39370" bIns="39370" numCol="1" spcCol="1270" anchor="ctr" anchorCtr="0">
-          <a:noAutofit/>
-        </a:bodyPr>
-        <a:lstStyle/>
-        <a:p>
-          <a:pPr lvl="0" algn="ctr" defTabSz="1377950">
-            <a:lnSpc>
-              <a:spcPct val="90000"/>
-            </a:lnSpc>
-            <a:spcBef>
-              <a:spcPct val="0"/>
-            </a:spcBef>
-            <a:spcAft>
-              <a:spcPct val="35000"/>
-            </a:spcAft>
-          </a:pPr>
-          <a:r>
-            <a:rPr lang="en-IN" sz="3100" kern="1200" dirty="0" smtClean="0"/>
-            <a:t>Layout</a:t>
-          </a:r>
-          <a:endParaRPr lang="en-IN" sz="3100" kern="1200" dirty="0"/>
-        </a:p>
-      </dsp:txBody>
-      <dsp:txXfrm>
-        <a:off x="2158525" y="1395306"/>
-        <a:ext cx="1544320" cy="1517226"/>
-      </dsp:txXfrm>
-    </dsp:sp>
   </dsp:spTree>
 </dsp:drawing>
 </file>
@@ -14048,8 +13855,8 @@
         </p:nvSpPr>
         <p:spPr>
           <a:xfrm>
-            <a:off x="2356835" y="2514600"/>
-            <a:ext cx="4404573" cy="3693017"/>
+            <a:off x="1803042" y="2514600"/>
+            <a:ext cx="5396247" cy="3693017"/>
           </a:xfrm>
         </p:spPr>
         <p:txBody>
@@ -14129,15 +13936,7 @@
             </a:br>
             <a:r>
               <a:rPr lang="en-IN" sz="2200" dirty="0" smtClean="0"/>
-              <a:t>@</a:t>
-            </a:r>
-            <a:r>
-              <a:rPr lang="en-IN" sz="2200" dirty="0" err="1" smtClean="0"/>
-              <a:t>ximanta.sarma</a:t>
-            </a:r>
-            <a:r>
-              <a:rPr lang="en-IN" sz="2200" dirty="0" smtClean="0"/>
-              <a:t/>
+              <a:t>@ximanta.sarma</a:t>
             </a:r>
             <a:br>
               <a:rPr lang="en-IN" sz="2200" dirty="0" smtClean="0"/>
@@ -14192,25 +13991,48 @@
             </a:br>
             <a:r>
               <a:rPr lang="en-IN" sz="2200" b="1" dirty="0" smtClean="0"/>
-              <a:t>Get the Slide</a:t>
+              <a:t>Get </a:t>
+            </a:r>
+            <a:r>
+              <a:rPr lang="en-IN" sz="2200" b="1" dirty="0" smtClean="0"/>
+              <a:t>the Demo Code and </a:t>
+            </a:r>
+            <a:r>
+              <a:rPr lang="en-IN" sz="2200" b="1" dirty="0" smtClean="0"/>
+              <a:t>Slide</a:t>
             </a:r>
             <a:r>
               <a:rPr lang="en-IN" sz="2200" dirty="0" smtClean="0"/>
               <a:t>:</a:t>
             </a:r>
-            <a:r>
-              <a:rPr lang="en-IN" sz="2200" dirty="0"/>
+            <a:br>
+              <a:rPr lang="en-IN" sz="2200" dirty="0" smtClean="0"/>
+            </a:br>
+            <a:r>
+              <a:rPr lang="en-IN" sz="2200" dirty="0" smtClean="0">
+                <a:hlinkClick r:id="rId5"/>
+              </a:rPr>
+              <a:t>https</a:t>
+            </a:r>
+            <a:r>
+              <a:rPr lang="en-IN" sz="2200" dirty="0">
+                <a:hlinkClick r:id="rId5"/>
+              </a:rPr>
+              <a:t>://</a:t>
+            </a:r>
+            <a:r>
+              <a:rPr lang="en-IN" sz="2200" dirty="0" smtClean="0">
+                <a:hlinkClick r:id="rId5"/>
+              </a:rPr>
+              <a:t>github.com/ximanta/presentations</a:t>
+            </a:r>
+            <a:r>
+              <a:rPr lang="en-IN" sz="2200" dirty="0" smtClean="0"/>
               <a:t/>
             </a:r>
             <a:br>
-              <a:rPr lang="en-IN" sz="2200" dirty="0"/>
+              <a:rPr lang="en-IN" sz="2200" dirty="0" smtClean="0"/>
             </a:br>
-            <a:r>
-              <a:rPr lang="en-IN" sz="2200" dirty="0">
-                <a:hlinkClick r:id="rId4"/>
-              </a:rPr>
-              <a:t>https://github.com/ximanta</a:t>
-            </a:r>
             <a:endParaRPr lang="en-IN" sz="2200" dirty="0"/>
           </a:p>
         </p:txBody>
@@ -14224,7 +14046,7 @@
         <p:spPr>
           <a:xfrm>
             <a:off x="6985125" y="2204313"/>
-            <a:ext cx="5206875" cy="1785104"/>
+            <a:ext cx="5206875" cy="1508105"/>
           </a:xfrm>
           <a:prstGeom prst="rect">
             <a:avLst/>
@@ -14245,31 +14067,32 @@
             <a:endParaRPr lang="en-IN" b="1" dirty="0" smtClean="0"/>
           </a:p>
           <a:p>
-            <a:endParaRPr lang="en-IN" b="1" dirty="0" smtClean="0"/>
-          </a:p>
-          <a:p>
             <a:r>
               <a:rPr lang="en-IN" sz="1400" dirty="0"/>
-              <a:t>https://www.balabit.com/blog/why-logging-is-important/ </a:t>
-            </a:r>
-            <a:endParaRPr lang="en-IN" sz="1400" dirty="0" smtClean="0"/>
+              <a:t>https</a:t>
+            </a:r>
+            <a:r>
+              <a:rPr lang="en-IN" sz="1400" dirty="0"/>
+              <a:t>://www.balabit.com/blog/why-logging-is-important/ </a:t>
+            </a:r>
+            <a:endParaRPr lang="en-IN" sz="1400" dirty="0"/>
           </a:p>
           <a:p>
             <a:r>
               <a:rPr lang="en-IN" sz="1400" dirty="0" smtClean="0">
-                <a:hlinkClick r:id="rId5"/>
+                <a:hlinkClick r:id="rId6"/>
               </a:rPr>
               <a:t>http</a:t>
             </a:r>
             <a:r>
               <a:rPr lang="en-IN" sz="1400" dirty="0">
-                <a:hlinkClick r:id="rId5"/>
+                <a:hlinkClick r:id="rId6"/>
               </a:rPr>
               <a:t>://</a:t>
             </a:r>
             <a:r>
               <a:rPr lang="en-IN" sz="1400" dirty="0" smtClean="0">
-                <a:hlinkClick r:id="rId5"/>
+                <a:hlinkClick r:id="rId6"/>
               </a:rPr>
               <a:t>stritti.github.io/log4js/docu/users-guide.html</a:t>
             </a:r>
@@ -14282,13 +14105,13 @@
             </a:br>
             <a:r>
               <a:rPr lang="en-IN" sz="1400" dirty="0">
-                <a:hlinkClick r:id="rId6"/>
+                <a:hlinkClick r:id="rId7"/>
               </a:rPr>
               <a:t>http://</a:t>
             </a:r>
             <a:r>
               <a:rPr lang="en-IN" sz="1400" dirty="0" smtClean="0">
-                <a:hlinkClick r:id="rId6"/>
+                <a:hlinkClick r:id="rId7"/>
               </a:rPr>
               <a:t>scratchpad.wikia.com/wiki/Log4js</a:t>
             </a:r>

</xml_diff>